<commit_message>
SCR Cluster layout angepasst
</commit_message>
<xml_diff>
--- a/agile moves/Perception (PER)/ger_PER_06_Staerkenspiegel_Retro.pptx
+++ b/agile moves/Perception (PER)/ger_PER_06_Staerkenspiegel_Retro.pptx
@@ -725,7 +725,7 @@
           <a:p>
             <a:fld id="{FF5B2BAF-DF38-0A48-A798-0C06E514FD52}" type="datetimeFigureOut">
               <a:rPr lang="de-DE" smtClean="0"/>
-              <a:t>29.05.15</a:t>
+              <a:t>30.05.15</a:t>
             </a:fld>
             <a:endParaRPr lang="de-DE" dirty="0"/>
           </a:p>
@@ -995,7 +995,7 @@
           <a:p>
             <a:fld id="{FF5B2BAF-DF38-0A48-A798-0C06E514FD52}" type="datetimeFigureOut">
               <a:rPr lang="de-DE" smtClean="0"/>
-              <a:t>29.05.15</a:t>
+              <a:t>30.05.15</a:t>
             </a:fld>
             <a:endParaRPr lang="de-DE" dirty="0"/>
           </a:p>

</xml_diff>